<commit_message>
Updated Main Menu of Presentation
</commit_message>
<xml_diff>
--- a/docs/Binding of Newton 4. Präsentation.pptx
+++ b/docs/Binding of Newton 4. Präsentation.pptx
@@ -3981,58 +3981,39 @@
           </a:p>
         </p:txBody>
       </p:sp>
-      <p:sp>
-        <p:nvSpPr>
-          <p:cNvPr id="3" name="Inhaltsplatzhalter 2">
+      <p:pic>
+        <p:nvPicPr>
+          <p:cNvPr id="10" name="Inhaltsplatzhalter 9">
             <a:extLst>
               <a:ext uri="{FF2B5EF4-FFF2-40B4-BE49-F238E27FC236}">
-                <a16:creationId xmlns:a16="http://schemas.microsoft.com/office/drawing/2014/main" id="{C6B387CC-9AF2-43B4-8D28-8FB5C8EB0B86}"/>
-              </a:ext>
-            </a:extLst>
-          </p:cNvPr>
-          <p:cNvSpPr>
-            <a:spLocks noGrp="1"/>
-          </p:cNvSpPr>
-          <p:nvPr>
-            <p:ph idx="1"/>
-          </p:nvPr>
-        </p:nvSpPr>
-        <p:spPr/>
-        <p:txBody>
-          <a:bodyPr/>
-          <a:lstStyle/>
-          <a:p>
-            <a:endParaRPr lang="de-IT"/>
-          </a:p>
-        </p:txBody>
-      </p:sp>
-      <p:pic>
-        <p:nvPicPr>
-          <p:cNvPr id="5" name="Grafik 4">
-            <a:extLst>
-              <a:ext uri="{FF2B5EF4-FFF2-40B4-BE49-F238E27FC236}">
-                <a16:creationId xmlns:a16="http://schemas.microsoft.com/office/drawing/2014/main" id="{FCFAC4EF-15BD-4CBA-84EF-D66A44AB652F}"/>
+                <a16:creationId xmlns:a16="http://schemas.microsoft.com/office/drawing/2014/main" id="{94261F21-7DBF-4F79-B227-6B52F5E7A4A8}"/>
               </a:ext>
             </a:extLst>
           </p:cNvPr>
           <p:cNvPicPr>
-            <a:picLocks noChangeAspect="1"/>
+            <a:picLocks noGrp="1" noChangeAspect="1"/>
           </p:cNvPicPr>
-          <p:nvPr/>
+          <p:nvPr>
+            <p:ph idx="1"/>
+          </p:nvPr>
         </p:nvPicPr>
-        <p:blipFill rotWithShape="1">
-          <a:blip r:embed="rId2"/>
-          <a:srcRect t="5726"/>
-          <a:stretch/>
+        <p:blipFill>
+          <a:blip r:embed="rId2">
+            <a:extLst>
+              <a:ext uri="{28A0092B-C50C-407E-A947-70E740481C1C}">
+                <a14:useLocalDpi xmlns:a14="http://schemas.microsoft.com/office/drawing/2010/main" val="0"/>
+              </a:ext>
+            </a:extLst>
+          </a:blip>
+          <a:stretch>
+            <a:fillRect/>
+          </a:stretch>
         </p:blipFill>
         <p:spPr>
           <a:xfrm>
-            <a:off x="318945" y="196343"/>
-            <a:ext cx="11554109" cy="6465313"/>
+            <a:off x="606010" y="266466"/>
+            <a:ext cx="11219630" cy="6325067"/>
           </a:xfrm>
-          <a:prstGeom prst="rect">
-            <a:avLst/>
-          </a:prstGeom>
         </p:spPr>
       </p:pic>
     </p:spTree>

</xml_diff>